<commit_message>
Implement and Mobile DevOps Strategy
</commit_message>
<xml_diff>
--- a/Azure DevOps/03 - Implement & Manage Build Infrastructure/Implement and Manage Build Infrastructure.pptx
+++ b/Azure DevOps/03 - Implement & Manage Build Infrastructure/Implement and Manage Build Infrastructure.pptx
@@ -12,14 +12,13 @@
     <p:sldId id="274" r:id="rId6"/>
     <p:sldId id="275" r:id="rId7"/>
     <p:sldId id="276" r:id="rId8"/>
-    <p:sldId id="279" r:id="rId9"/>
-    <p:sldId id="277" r:id="rId10"/>
-    <p:sldId id="278" r:id="rId11"/>
-    <p:sldId id="280" r:id="rId12"/>
+    <p:sldId id="277" r:id="rId9"/>
+    <p:sldId id="278" r:id="rId10"/>
+    <p:sldId id="280" r:id="rId11"/>
+    <p:sldId id="279" r:id="rId12"/>
     <p:sldId id="281" r:id="rId13"/>
     <p:sldId id="282" r:id="rId14"/>
-    <p:sldId id="283" r:id="rId15"/>
-    <p:sldId id="270" r:id="rId16"/>
+    <p:sldId id="270" r:id="rId15"/>
   </p:sldIdLst>
   <p:sldSz cx="12192000" cy="6858000"/>
   <p:notesSz cx="6858000" cy="9144000"/>
@@ -273,7 +272,7 @@
           <a:p>
             <a:fld id="{CCA4416E-9685-46BA-8E42-6BC8F6CB8600}" type="datetimeFigureOut">
               <a:rPr lang="en-US" smtClean="0"/>
-              <a:t>6/2/2019</a:t>
+              <a:t>7/5/2019</a:t>
             </a:fld>
             <a:endParaRPr lang="en-US"/>
           </a:p>
@@ -471,7 +470,7 @@
           <a:p>
             <a:fld id="{CCA4416E-9685-46BA-8E42-6BC8F6CB8600}" type="datetimeFigureOut">
               <a:rPr lang="en-US" smtClean="0"/>
-              <a:t>6/2/2019</a:t>
+              <a:t>7/5/2019</a:t>
             </a:fld>
             <a:endParaRPr lang="en-US"/>
           </a:p>
@@ -679,7 +678,7 @@
           <a:p>
             <a:fld id="{CCA4416E-9685-46BA-8E42-6BC8F6CB8600}" type="datetimeFigureOut">
               <a:rPr lang="en-US" smtClean="0"/>
-              <a:t>6/2/2019</a:t>
+              <a:t>7/5/2019</a:t>
             </a:fld>
             <a:endParaRPr lang="en-US"/>
           </a:p>
@@ -877,7 +876,7 @@
           <a:p>
             <a:fld id="{CCA4416E-9685-46BA-8E42-6BC8F6CB8600}" type="datetimeFigureOut">
               <a:rPr lang="en-US" smtClean="0"/>
-              <a:t>6/2/2019</a:t>
+              <a:t>7/5/2019</a:t>
             </a:fld>
             <a:endParaRPr lang="en-US"/>
           </a:p>
@@ -1152,7 +1151,7 @@
           <a:p>
             <a:fld id="{CCA4416E-9685-46BA-8E42-6BC8F6CB8600}" type="datetimeFigureOut">
               <a:rPr lang="en-US" smtClean="0"/>
-              <a:t>6/2/2019</a:t>
+              <a:t>7/5/2019</a:t>
             </a:fld>
             <a:endParaRPr lang="en-US"/>
           </a:p>
@@ -1417,7 +1416,7 @@
           <a:p>
             <a:fld id="{CCA4416E-9685-46BA-8E42-6BC8F6CB8600}" type="datetimeFigureOut">
               <a:rPr lang="en-US" smtClean="0"/>
-              <a:t>6/2/2019</a:t>
+              <a:t>7/5/2019</a:t>
             </a:fld>
             <a:endParaRPr lang="en-US"/>
           </a:p>
@@ -1829,7 +1828,7 @@
           <a:p>
             <a:fld id="{CCA4416E-9685-46BA-8E42-6BC8F6CB8600}" type="datetimeFigureOut">
               <a:rPr lang="en-US" smtClean="0"/>
-              <a:t>6/2/2019</a:t>
+              <a:t>7/5/2019</a:t>
             </a:fld>
             <a:endParaRPr lang="en-US"/>
           </a:p>
@@ -1970,7 +1969,7 @@
           <a:p>
             <a:fld id="{CCA4416E-9685-46BA-8E42-6BC8F6CB8600}" type="datetimeFigureOut">
               <a:rPr lang="en-US" smtClean="0"/>
-              <a:t>6/2/2019</a:t>
+              <a:t>7/5/2019</a:t>
             </a:fld>
             <a:endParaRPr lang="en-US"/>
           </a:p>
@@ -2083,7 +2082,7 @@
           <a:p>
             <a:fld id="{CCA4416E-9685-46BA-8E42-6BC8F6CB8600}" type="datetimeFigureOut">
               <a:rPr lang="en-US" smtClean="0"/>
-              <a:t>6/2/2019</a:t>
+              <a:t>7/5/2019</a:t>
             </a:fld>
             <a:endParaRPr lang="en-US"/>
           </a:p>
@@ -2394,7 +2393,7 @@
           <a:p>
             <a:fld id="{CCA4416E-9685-46BA-8E42-6BC8F6CB8600}" type="datetimeFigureOut">
               <a:rPr lang="en-US" smtClean="0"/>
-              <a:t>6/2/2019</a:t>
+              <a:t>7/5/2019</a:t>
             </a:fld>
             <a:endParaRPr lang="en-US"/>
           </a:p>
@@ -2682,7 +2681,7 @@
           <a:p>
             <a:fld id="{CCA4416E-9685-46BA-8E42-6BC8F6CB8600}" type="datetimeFigureOut">
               <a:rPr lang="en-US" smtClean="0"/>
-              <a:t>6/2/2019</a:t>
+              <a:t>7/5/2019</a:t>
             </a:fld>
             <a:endParaRPr lang="en-US"/>
           </a:p>
@@ -2923,7 +2922,7 @@
           <a:p>
             <a:fld id="{CCA4416E-9685-46BA-8E42-6BC8F6CB8600}" type="datetimeFigureOut">
               <a:rPr lang="en-US" smtClean="0"/>
-              <a:t>6/2/2019</a:t>
+              <a:t>7/5/2019</a:t>
             </a:fld>
             <a:endParaRPr lang="en-US"/>
           </a:p>
@@ -3879,7 +3878,7 @@
     </p:spTree>
     <p:extLst>
       <p:ext uri="{BB962C8B-B14F-4D97-AF65-F5344CB8AC3E}">
-        <p14:creationId xmlns:p14="http://schemas.microsoft.com/office/powerpoint/2010/main" val="2752119588"/>
+        <p14:creationId xmlns:p14="http://schemas.microsoft.com/office/powerpoint/2010/main" val="1983999582"/>
       </p:ext>
     </p:extLst>
   </p:cSld>
@@ -3890,7 +3889,7 @@
 </file>
 
 <file path=ppt/slides/slide11.xml><?xml version="1.0" encoding="utf-8"?>
-<p:sld xmlns:a="http://schemas.openxmlformats.org/drawingml/2006/main" xmlns:r="http://schemas.openxmlformats.org/officeDocument/2006/relationships" xmlns:p="http://schemas.openxmlformats.org/presentationml/2006/main">
+<p:sld xmlns:a="http://schemas.openxmlformats.org/drawingml/2006/main" xmlns:r="http://schemas.openxmlformats.org/officeDocument/2006/relationships" xmlns:p="http://schemas.openxmlformats.org/presentationml/2006/main" show="0">
   <p:cSld>
     <p:spTree>
       <p:nvGrpSpPr>
@@ -3924,17 +3923,12 @@
         </p:nvSpPr>
         <p:spPr/>
         <p:txBody>
-          <a:bodyPr>
-            <a:normAutofit/>
-          </a:bodyPr>
-          <a:lstStyle/>
-          <a:p>
-            <a:r>
-              <a:rPr lang="en-US" sz="3600" dirty="0">
-                <a:latin typeface="Segoe UI Semibold" panose="020B0702040204020203" pitchFamily="34" charset="0"/>
-                <a:cs typeface="Segoe UI Semibold" panose="020B0702040204020203" pitchFamily="34" charset="0"/>
-              </a:rPr>
-              <a:t>Agent pools</a:t>
+          <a:bodyPr/>
+          <a:lstStyle/>
+          <a:p>
+            <a:r>
+              <a:rPr lang="en-US" dirty="0"/>
+              <a:t>Default agent pools</a:t>
             </a:r>
           </a:p>
         </p:txBody>
@@ -3960,15 +3954,51 @@
           <a:bodyPr/>
           <a:lstStyle/>
           <a:p>
-            <a:pPr marL="0" indent="0">
-              <a:buNone/>
-            </a:pPr>
-            <a:r>
-              <a:rPr lang="en-US" dirty="0">
-                <a:latin typeface="Segoe UI Semilight" panose="020B0402040204020203" pitchFamily="34" charset="0"/>
-                <a:cs typeface="Segoe UI Semilight" panose="020B0402040204020203" pitchFamily="34" charset="0"/>
-              </a:rPr>
-              <a:t>Instead of managing each agent individually, you organize agents into agent pools. In Azure Pipelines, pools are scoped to the entire organization; so you can share the agent machines across projects. In Azure DevOps Server, agent pools are scoped to the entire server; so you can share the agent machines across projects and collections.</a:t>
+            <a:r>
+              <a:rPr lang="en-US" dirty="0"/>
+              <a:t>Default pool: for self-hosted agents</a:t>
+            </a:r>
+          </a:p>
+          <a:p>
+            <a:r>
+              <a:rPr lang="en-US" dirty="0"/>
+              <a:t>Hosted Ubuntu 1604 pool</a:t>
+            </a:r>
+          </a:p>
+          <a:p>
+            <a:r>
+              <a:rPr lang="en-US" dirty="0"/>
+              <a:t>Hosted macOS pool</a:t>
+            </a:r>
+          </a:p>
+          <a:p>
+            <a:r>
+              <a:rPr lang="en-US" dirty="0"/>
+              <a:t>Hosted macOS High Sierra pool</a:t>
+            </a:r>
+          </a:p>
+          <a:p>
+            <a:r>
+              <a:rPr lang="en-US" dirty="0"/>
+              <a:t>Hosted Windows 2019 with VS2019 pool</a:t>
+            </a:r>
+          </a:p>
+          <a:p>
+            <a:r>
+              <a:rPr lang="en-US" dirty="0"/>
+              <a:t>Hosted VS2017 pool</a:t>
+            </a:r>
+          </a:p>
+          <a:p>
+            <a:r>
+              <a:rPr lang="en-US" dirty="0"/>
+              <a:t>Hosted pool</a:t>
+            </a:r>
+          </a:p>
+          <a:p>
+            <a:r>
+              <a:rPr lang="en-US" dirty="0"/>
+              <a:t>Hosted Windows Container pool</a:t>
             </a:r>
           </a:p>
         </p:txBody>
@@ -3976,7 +4006,7 @@
     </p:spTree>
     <p:extLst>
       <p:ext uri="{BB962C8B-B14F-4D97-AF65-F5344CB8AC3E}">
-        <p14:creationId xmlns:p14="http://schemas.microsoft.com/office/powerpoint/2010/main" val="1983999582"/>
+        <p14:creationId xmlns:p14="http://schemas.microsoft.com/office/powerpoint/2010/main" val="4027327343"/>
       </p:ext>
     </p:extLst>
   </p:cSld>
@@ -4438,104 +4468,6 @@
       </p:grpSpPr>
       <p:sp>
         <p:nvSpPr>
-          <p:cNvPr id="4" name="Title 3">
-            <a:extLst>
-              <a:ext uri="{FF2B5EF4-FFF2-40B4-BE49-F238E27FC236}">
-                <a16:creationId xmlns:a16="http://schemas.microsoft.com/office/drawing/2014/main" id="{DC71FF24-E935-45D6-A3F5-6CBEC1AE0439}"/>
-              </a:ext>
-            </a:extLst>
-          </p:cNvPr>
-          <p:cNvSpPr txBox="1">
-            <a:spLocks/>
-          </p:cNvSpPr>
-          <p:nvPr/>
-        </p:nvSpPr>
-        <p:spPr>
-          <a:xfrm>
-            <a:off x="588262" y="2425541"/>
-            <a:ext cx="11162304" cy="1107996"/>
-          </a:xfrm>
-          <a:prstGeom prst="rect">
-            <a:avLst/>
-          </a:prstGeom>
-        </p:spPr>
-        <p:txBody>
-          <a:bodyPr vert="horz" lIns="91440" tIns="45720" rIns="91440" bIns="45720" rtlCol="0" anchor="b">
-            <a:normAutofit fontScale="85000" lnSpcReduction="10000"/>
-          </a:bodyPr>
-          <a:lstStyle>
-            <a:lvl1pPr algn="ctr" defTabSz="914400" rtl="0" eaLnBrk="1" latinLnBrk="0" hangingPunct="1">
-              <a:lnSpc>
-                <a:spcPct val="90000"/>
-              </a:lnSpc>
-              <a:spcBef>
-                <a:spcPct val="0"/>
-              </a:spcBef>
-              <a:buNone/>
-              <a:defRPr sz="6000" kern="1200">
-                <a:solidFill>
-                  <a:schemeClr val="tx1"/>
-                </a:solidFill>
-                <a:latin typeface="+mj-lt"/>
-                <a:ea typeface="+mj-ea"/>
-                <a:cs typeface="+mj-cs"/>
-              </a:defRPr>
-            </a:lvl1pPr>
-          </a:lstStyle>
-          <a:p>
-            <a:pPr algn="l"/>
-            <a:r>
-              <a:rPr lang="en-US" sz="3600" dirty="0">
-                <a:latin typeface="Segoe UI Semibold" panose="020B0702040204020203" pitchFamily="34" charset="0"/>
-                <a:cs typeface="Segoe UI Semibold" panose="020B0702040204020203" pitchFamily="34" charset="0"/>
-              </a:rPr>
-              <a:t>Demo</a:t>
-            </a:r>
-          </a:p>
-          <a:p>
-            <a:pPr algn="l"/>
-            <a:r>
-              <a:rPr lang="en-US" sz="3600" dirty="0">
-                <a:latin typeface="Segoe UI Semibold" panose="020B0702040204020203" pitchFamily="34" charset="0"/>
-                <a:cs typeface="Segoe UI Semibold" panose="020B0702040204020203" pitchFamily="34" charset="0"/>
-              </a:rPr>
-              <a:t>Deploying a multi-container to Azure Kubernetes Services </a:t>
-            </a:r>
-          </a:p>
-        </p:txBody>
-      </p:sp>
-    </p:spTree>
-    <p:extLst>
-      <p:ext uri="{BB962C8B-B14F-4D97-AF65-F5344CB8AC3E}">
-        <p14:creationId xmlns:p14="http://schemas.microsoft.com/office/powerpoint/2010/main" val="2822413012"/>
-      </p:ext>
-    </p:extLst>
-  </p:cSld>
-  <p:clrMapOvr>
-    <a:masterClrMapping/>
-  </p:clrMapOvr>
-</p:sld>
-</file>
-
-<file path=ppt/slides/slide15.xml><?xml version="1.0" encoding="utf-8"?>
-<p:sld xmlns:a="http://schemas.openxmlformats.org/drawingml/2006/main" xmlns:r="http://schemas.openxmlformats.org/officeDocument/2006/relationships" xmlns:p="http://schemas.openxmlformats.org/presentationml/2006/main">
-  <p:cSld>
-    <p:spTree>
-      <p:nvGrpSpPr>
-        <p:cNvPr id="1" name=""/>
-        <p:cNvGrpSpPr/>
-        <p:nvPr/>
-      </p:nvGrpSpPr>
-      <p:grpSpPr>
-        <a:xfrm>
-          <a:off x="0" y="0"/>
-          <a:ext cx="0" cy="0"/>
-          <a:chOff x="0" y="0"/>
-          <a:chExt cx="0" cy="0"/>
-        </a:xfrm>
-      </p:grpSpPr>
-      <p:sp>
-        <p:nvSpPr>
           <p:cNvPr id="2" name="Title 1">
             <a:extLst>
               <a:ext uri="{FF2B5EF4-FFF2-40B4-BE49-F238E27FC236}">
@@ -5368,159 +5300,58 @@
       </p:grpSpPr>
       <p:sp>
         <p:nvSpPr>
-          <p:cNvPr id="2" name="Title 1">
-            <a:extLst>
-              <a:ext uri="{FF2B5EF4-FFF2-40B4-BE49-F238E27FC236}">
-                <a16:creationId xmlns:a16="http://schemas.microsoft.com/office/drawing/2014/main" id="{C1C06149-03B0-4F27-879E-29E8F940A7BB}"/>
-              </a:ext>
-            </a:extLst>
-          </p:cNvPr>
-          <p:cNvSpPr>
-            <a:spLocks noGrp="1"/>
-          </p:cNvSpPr>
-          <p:nvPr>
-            <p:ph type="title"/>
-          </p:nvPr>
-        </p:nvSpPr>
-        <p:spPr/>
-        <p:txBody>
-          <a:bodyPr>
+          <p:cNvPr id="4" name="Title 3">
+            <a:extLst>
+              <a:ext uri="{FF2B5EF4-FFF2-40B4-BE49-F238E27FC236}">
+                <a16:creationId xmlns:a16="http://schemas.microsoft.com/office/drawing/2014/main" id="{DC71FF24-E935-45D6-A3F5-6CBEC1AE0439}"/>
+              </a:ext>
+            </a:extLst>
+          </p:cNvPr>
+          <p:cNvSpPr txBox="1">
+            <a:spLocks/>
+          </p:cNvSpPr>
+          <p:nvPr/>
+        </p:nvSpPr>
+        <p:spPr>
+          <a:xfrm>
+            <a:off x="588263" y="2425541"/>
+            <a:ext cx="7073778" cy="1107996"/>
+          </a:xfrm>
+          <a:prstGeom prst="rect">
+            <a:avLst/>
+          </a:prstGeom>
+        </p:spPr>
+        <p:txBody>
+          <a:bodyPr vert="horz" lIns="91440" tIns="45720" rIns="91440" bIns="45720" rtlCol="0" anchor="b">
             <a:normAutofit/>
           </a:bodyPr>
-          <a:lstStyle/>
-          <a:p>
+          <a:lstStyle>
+            <a:lvl1pPr algn="ctr" defTabSz="914400" rtl="0" eaLnBrk="1" latinLnBrk="0" hangingPunct="1">
+              <a:lnSpc>
+                <a:spcPct val="90000"/>
+              </a:lnSpc>
+              <a:spcBef>
+                <a:spcPct val="0"/>
+              </a:spcBef>
+              <a:buNone/>
+              <a:defRPr sz="6000" kern="1200">
+                <a:solidFill>
+                  <a:schemeClr val="tx1"/>
+                </a:solidFill>
+                <a:latin typeface="+mj-lt"/>
+                <a:ea typeface="+mj-ea"/>
+                <a:cs typeface="+mj-cs"/>
+              </a:defRPr>
+            </a:lvl1pPr>
+          </a:lstStyle>
+          <a:p>
+            <a:pPr algn="l"/>
             <a:r>
               <a:rPr lang="en-US" sz="3600" dirty="0">
                 <a:latin typeface="Segoe UI Semibold" panose="020B0702040204020203" pitchFamily="34" charset="0"/>
                 <a:cs typeface="Segoe UI Semibold" panose="020B0702040204020203" pitchFamily="34" charset="0"/>
               </a:rPr>
-              <a:t>Default agent pools</a:t>
-            </a:r>
-          </a:p>
-        </p:txBody>
-      </p:sp>
-      <p:sp>
-        <p:nvSpPr>
-          <p:cNvPr id="3" name="Content Placeholder 2">
-            <a:extLst>
-              <a:ext uri="{FF2B5EF4-FFF2-40B4-BE49-F238E27FC236}">
-                <a16:creationId xmlns:a16="http://schemas.microsoft.com/office/drawing/2014/main" id="{FC4D979C-6A82-41A3-8759-30C14146EA56}"/>
-              </a:ext>
-            </a:extLst>
-          </p:cNvPr>
-          <p:cNvSpPr>
-            <a:spLocks noGrp="1"/>
-          </p:cNvSpPr>
-          <p:nvPr>
-            <p:ph idx="1"/>
-          </p:nvPr>
-        </p:nvSpPr>
-        <p:spPr/>
-        <p:txBody>
-          <a:bodyPr/>
-          <a:lstStyle/>
-          <a:p>
-            <a:pPr>
-              <a:buFontTx/>
-              <a:buChar char="-"/>
-            </a:pPr>
-            <a:r>
-              <a:rPr lang="en-US" dirty="0">
-                <a:latin typeface="Segoe UI Semilight" panose="020B0402040204020203" pitchFamily="34" charset="0"/>
-                <a:cs typeface="Segoe UI Semilight" panose="020B0402040204020203" pitchFamily="34" charset="0"/>
-              </a:rPr>
-              <a:t>Default pool: for self-hosted agents</a:t>
-            </a:r>
-          </a:p>
-          <a:p>
-            <a:pPr>
-              <a:buFontTx/>
-              <a:buChar char="-"/>
-            </a:pPr>
-            <a:r>
-              <a:rPr lang="en-US" dirty="0">
-                <a:latin typeface="Segoe UI Semilight" panose="020B0402040204020203" pitchFamily="34" charset="0"/>
-                <a:cs typeface="Segoe UI Semilight" panose="020B0402040204020203" pitchFamily="34" charset="0"/>
-              </a:rPr>
-              <a:t>Hosted Ubuntu 1604 pool</a:t>
-            </a:r>
-          </a:p>
-          <a:p>
-            <a:pPr>
-              <a:buFontTx/>
-              <a:buChar char="-"/>
-            </a:pPr>
-            <a:r>
-              <a:rPr lang="en-US" dirty="0">
-                <a:latin typeface="Segoe UI Semilight" panose="020B0402040204020203" pitchFamily="34" charset="0"/>
-                <a:cs typeface="Segoe UI Semilight" panose="020B0402040204020203" pitchFamily="34" charset="0"/>
-              </a:rPr>
-              <a:t>Hosted macOS pool</a:t>
-            </a:r>
-          </a:p>
-          <a:p>
-            <a:pPr>
-              <a:buFontTx/>
-              <a:buChar char="-"/>
-            </a:pPr>
-            <a:r>
-              <a:rPr lang="en-US" dirty="0">
-                <a:latin typeface="Segoe UI Semilight" panose="020B0402040204020203" pitchFamily="34" charset="0"/>
-                <a:cs typeface="Segoe UI Semilight" panose="020B0402040204020203" pitchFamily="34" charset="0"/>
-              </a:rPr>
-              <a:t>Hosted macOS High Sierra pool</a:t>
-            </a:r>
-          </a:p>
-          <a:p>
-            <a:pPr>
-              <a:buFontTx/>
-              <a:buChar char="-"/>
-            </a:pPr>
-            <a:r>
-              <a:rPr lang="en-US" dirty="0">
-                <a:latin typeface="Segoe UI Semilight" panose="020B0402040204020203" pitchFamily="34" charset="0"/>
-                <a:cs typeface="Segoe UI Semilight" panose="020B0402040204020203" pitchFamily="34" charset="0"/>
-              </a:rPr>
-              <a:t>Hosted Windows 2019 with VS2019 pool</a:t>
-            </a:r>
-          </a:p>
-          <a:p>
-            <a:pPr>
-              <a:buFontTx/>
-              <a:buChar char="-"/>
-            </a:pPr>
-            <a:r>
-              <a:rPr lang="en-US" dirty="0">
-                <a:latin typeface="Segoe UI Semilight" panose="020B0402040204020203" pitchFamily="34" charset="0"/>
-                <a:cs typeface="Segoe UI Semilight" panose="020B0402040204020203" pitchFamily="34" charset="0"/>
-              </a:rPr>
-              <a:t>Hosted VS2017 pool</a:t>
-            </a:r>
-          </a:p>
-          <a:p>
-            <a:pPr>
-              <a:buFontTx/>
-              <a:buChar char="-"/>
-            </a:pPr>
-            <a:r>
-              <a:rPr lang="en-US" dirty="0">
-                <a:latin typeface="Segoe UI Semilight" panose="020B0402040204020203" pitchFamily="34" charset="0"/>
-                <a:cs typeface="Segoe UI Semilight" panose="020B0402040204020203" pitchFamily="34" charset="0"/>
-              </a:rPr>
-              <a:t>Hosted pool</a:t>
-            </a:r>
-          </a:p>
-          <a:p>
-            <a:pPr>
-              <a:buFontTx/>
-              <a:buChar char="-"/>
-            </a:pPr>
-            <a:r>
-              <a:rPr lang="en-US" dirty="0">
-                <a:latin typeface="Segoe UI Semilight" panose="020B0402040204020203" pitchFamily="34" charset="0"/>
-                <a:cs typeface="Segoe UI Semilight" panose="020B0402040204020203" pitchFamily="34" charset="0"/>
-              </a:rPr>
-              <a:t>Hosted Windows Container pool</a:t>
+              <a:t>Agent Pools</a:t>
             </a:r>
           </a:p>
         </p:txBody>
@@ -5528,7 +5359,7 @@
     </p:spTree>
     <p:extLst>
       <p:ext uri="{BB962C8B-B14F-4D97-AF65-F5344CB8AC3E}">
-        <p14:creationId xmlns:p14="http://schemas.microsoft.com/office/powerpoint/2010/main" val="4027327343"/>
+        <p14:creationId xmlns:p14="http://schemas.microsoft.com/office/powerpoint/2010/main" val="764384561"/>
       </p:ext>
     </p:extLst>
   </p:cSld>
@@ -5557,58 +5388,67 @@
       </p:grpSpPr>
       <p:sp>
         <p:nvSpPr>
-          <p:cNvPr id="4" name="Title 3">
-            <a:extLst>
-              <a:ext uri="{FF2B5EF4-FFF2-40B4-BE49-F238E27FC236}">
-                <a16:creationId xmlns:a16="http://schemas.microsoft.com/office/drawing/2014/main" id="{DC71FF24-E935-45D6-A3F5-6CBEC1AE0439}"/>
-              </a:ext>
-            </a:extLst>
-          </p:cNvPr>
-          <p:cNvSpPr txBox="1">
-            <a:spLocks/>
-          </p:cNvSpPr>
-          <p:nvPr/>
-        </p:nvSpPr>
-        <p:spPr>
-          <a:xfrm>
-            <a:off x="588263" y="2425541"/>
-            <a:ext cx="7073778" cy="1107996"/>
-          </a:xfrm>
-          <a:prstGeom prst="rect">
-            <a:avLst/>
-          </a:prstGeom>
-        </p:spPr>
-        <p:txBody>
-          <a:bodyPr vert="horz" lIns="91440" tIns="45720" rIns="91440" bIns="45720" rtlCol="0" anchor="b">
+          <p:cNvPr id="2" name="Title 1">
+            <a:extLst>
+              <a:ext uri="{FF2B5EF4-FFF2-40B4-BE49-F238E27FC236}">
+                <a16:creationId xmlns:a16="http://schemas.microsoft.com/office/drawing/2014/main" id="{C1C06149-03B0-4F27-879E-29E8F940A7BB}"/>
+              </a:ext>
+            </a:extLst>
+          </p:cNvPr>
+          <p:cNvSpPr>
+            <a:spLocks noGrp="1"/>
+          </p:cNvSpPr>
+          <p:nvPr>
+            <p:ph type="title"/>
+          </p:nvPr>
+        </p:nvSpPr>
+        <p:spPr/>
+        <p:txBody>
+          <a:bodyPr>
             <a:normAutofit/>
           </a:bodyPr>
-          <a:lstStyle>
-            <a:lvl1pPr algn="ctr" defTabSz="914400" rtl="0" eaLnBrk="1" latinLnBrk="0" hangingPunct="1">
-              <a:lnSpc>
-                <a:spcPct val="90000"/>
-              </a:lnSpc>
-              <a:spcBef>
-                <a:spcPct val="0"/>
-              </a:spcBef>
-              <a:buNone/>
-              <a:defRPr sz="6000" kern="1200">
-                <a:solidFill>
-                  <a:schemeClr val="tx1"/>
-                </a:solidFill>
-                <a:latin typeface="+mj-lt"/>
-                <a:ea typeface="+mj-ea"/>
-                <a:cs typeface="+mj-cs"/>
-              </a:defRPr>
-            </a:lvl1pPr>
-          </a:lstStyle>
-          <a:p>
-            <a:pPr algn="l"/>
+          <a:lstStyle/>
+          <a:p>
             <a:r>
               <a:rPr lang="en-US" sz="3600" dirty="0">
                 <a:latin typeface="Segoe UI Semibold" panose="020B0702040204020203" pitchFamily="34" charset="0"/>
                 <a:cs typeface="Segoe UI Semibold" panose="020B0702040204020203" pitchFamily="34" charset="0"/>
               </a:rPr>
-              <a:t>Agent Pools</a:t>
+              <a:t>Agent pools</a:t>
+            </a:r>
+          </a:p>
+        </p:txBody>
+      </p:sp>
+      <p:sp>
+        <p:nvSpPr>
+          <p:cNvPr id="3" name="Content Placeholder 2">
+            <a:extLst>
+              <a:ext uri="{FF2B5EF4-FFF2-40B4-BE49-F238E27FC236}">
+                <a16:creationId xmlns:a16="http://schemas.microsoft.com/office/drawing/2014/main" id="{FC4D979C-6A82-41A3-8759-30C14146EA56}"/>
+              </a:ext>
+            </a:extLst>
+          </p:cNvPr>
+          <p:cNvSpPr>
+            <a:spLocks noGrp="1"/>
+          </p:cNvSpPr>
+          <p:nvPr>
+            <p:ph idx="1"/>
+          </p:nvPr>
+        </p:nvSpPr>
+        <p:spPr/>
+        <p:txBody>
+          <a:bodyPr/>
+          <a:lstStyle/>
+          <a:p>
+            <a:pPr marL="0" indent="0">
+              <a:buNone/>
+            </a:pPr>
+            <a:r>
+              <a:rPr lang="en-US" dirty="0">
+                <a:latin typeface="Segoe UI Semilight" panose="020B0402040204020203" pitchFamily="34" charset="0"/>
+                <a:cs typeface="Segoe UI Semilight" panose="020B0402040204020203" pitchFamily="34" charset="0"/>
+              </a:rPr>
+              <a:t>Instead of managing each agent individually, you organize agents into agent pools. In Azure Pipelines, pools are scoped to the entire organization; so you can share the agent machines across projects. In Azure DevOps Server, agent pools are scoped to the entire server; so you can share the agent machines across projects and collections.</a:t>
             </a:r>
           </a:p>
         </p:txBody>
@@ -5616,7 +5456,7 @@
     </p:spTree>
     <p:extLst>
       <p:ext uri="{BB962C8B-B14F-4D97-AF65-F5344CB8AC3E}">
-        <p14:creationId xmlns:p14="http://schemas.microsoft.com/office/powerpoint/2010/main" val="764384561"/>
+        <p14:creationId xmlns:p14="http://schemas.microsoft.com/office/powerpoint/2010/main" val="2752119588"/>
       </p:ext>
     </p:extLst>
   </p:cSld>

</xml_diff>